<commit_message>
Added service hub and command annotation
</commit_message>
<xml_diff>
--- a/doc/DownloadMetadata.pptx
+++ b/doc/DownloadMetadata.pptx
@@ -806,6 +806,90 @@
     <p:extLst>
       <p:ext uri="{BB962C8B-B14F-4D97-AF65-F5344CB8AC3E}">
         <p14:creationId xmlns:p14="http://schemas.microsoft.com/office/powerpoint/2010/main" val="4262906866"/>
+      </p:ext>
+    </p:extLst>
+  </p:cSld>
+  <p:clrMapOvr>
+    <a:masterClrMapping/>
+  </p:clrMapOvr>
+</p:notes>
+</file>
+
+<file path=ppt/notesSlides/notesSlide3.xml><?xml version="1.0" encoding="utf-8"?>
+<p:notes xmlns:a="http://schemas.openxmlformats.org/drawingml/2006/main" xmlns:r="http://schemas.openxmlformats.org/officeDocument/2006/relationships" xmlns:p="http://schemas.openxmlformats.org/presentationml/2006/main">
+  <p:cSld>
+    <p:spTree>
+      <p:nvGrpSpPr>
+        <p:cNvPr id="1" name=""/>
+        <p:cNvGrpSpPr/>
+        <p:nvPr/>
+      </p:nvGrpSpPr>
+      <p:grpSpPr>
+        <a:xfrm>
+          <a:off x="0" y="0"/>
+          <a:ext cx="0" cy="0"/>
+          <a:chOff x="0" y="0"/>
+          <a:chExt cx="0" cy="0"/>
+        </a:xfrm>
+      </p:grpSpPr>
+      <p:sp>
+        <p:nvSpPr>
+          <p:cNvPr id="2" name="Slide Image Placeholder 1"/>
+          <p:cNvSpPr>
+            <a:spLocks noGrp="1" noRot="1" noChangeAspect="1"/>
+          </p:cNvSpPr>
+          <p:nvPr>
+            <p:ph type="sldImg"/>
+          </p:nvPr>
+        </p:nvSpPr>
+        <p:spPr/>
+      </p:sp>
+      <p:sp>
+        <p:nvSpPr>
+          <p:cNvPr id="3" name="Notes Placeholder 2"/>
+          <p:cNvSpPr>
+            <a:spLocks noGrp="1"/>
+          </p:cNvSpPr>
+          <p:nvPr>
+            <p:ph type="body" idx="1"/>
+          </p:nvPr>
+        </p:nvSpPr>
+        <p:spPr/>
+        <p:txBody>
+          <a:bodyPr/>
+          <a:lstStyle/>
+          <a:p>
+            <a:endParaRPr lang="en-US" dirty="0"/>
+          </a:p>
+        </p:txBody>
+      </p:sp>
+      <p:sp>
+        <p:nvSpPr>
+          <p:cNvPr id="4" name="Slide Number Placeholder 3"/>
+          <p:cNvSpPr>
+            <a:spLocks noGrp="1"/>
+          </p:cNvSpPr>
+          <p:nvPr>
+            <p:ph type="sldNum" sz="quarter" idx="10"/>
+          </p:nvPr>
+        </p:nvSpPr>
+        <p:spPr/>
+        <p:txBody>
+          <a:bodyPr/>
+          <a:lstStyle/>
+          <a:p>
+            <a:fld id="{32112E60-FBEE-B24D-8EDA-CCFE9E2440A2}" type="slidenum">
+              <a:rPr lang="en-US" smtClean="0"/>
+              <a:t>3</a:t>
+            </a:fld>
+            <a:endParaRPr lang="en-US"/>
+          </a:p>
+        </p:txBody>
+      </p:sp>
+    </p:spTree>
+    <p:extLst>
+      <p:ext uri="{BB962C8B-B14F-4D97-AF65-F5344CB8AC3E}">
+        <p14:creationId xmlns:p14="http://schemas.microsoft.com/office/powerpoint/2010/main" val="2138209579"/>
       </p:ext>
     </p:extLst>
   </p:cSld>
@@ -5696,27 +5780,31 @@
             </a:r>
             <a:r>
               <a:rPr lang="en-US" dirty="0" smtClean="0"/>
-              <a:t> create-task –</a:t>
+              <a:t> create-task </a:t>
+            </a:r>
+            <a:r>
+              <a:rPr lang="en-US" dirty="0"/>
+              <a:t> [–</a:t>
+            </a:r>
+            <a:r>
+              <a:rPr lang="en-US" dirty="0" err="1"/>
+              <a:t>threadNumber</a:t>
+            </a:r>
+            <a:r>
+              <a:rPr lang="en-US" dirty="0"/>
+              <a:t> xx</a:t>
+            </a:r>
+            <a:r>
+              <a:rPr lang="en-US" dirty="0" smtClean="0"/>
+              <a:t>] </a:t>
             </a:r>
             <a:r>
               <a:rPr lang="en-US" dirty="0" err="1" smtClean="0"/>
               <a:t>url</a:t>
             </a:r>
             <a:r>
-              <a:rPr lang="en-US" dirty="0"/>
-              <a:t> </a:t>
-            </a:r>
-            <a:r>
               <a:rPr lang="en-US" dirty="0" smtClean="0"/>
-              <a:t>“xx” [–folder “xx”] [–filename “xx”] [–</a:t>
-            </a:r>
-            <a:r>
-              <a:rPr lang="en-US" dirty="0" err="1" smtClean="0"/>
-              <a:t>threadNumber</a:t>
-            </a:r>
-            <a:r>
-              <a:rPr lang="en-US" dirty="0" smtClean="0"/>
-              <a:t> xx]</a:t>
+              <a:t> folder filename</a:t>
             </a:r>
           </a:p>
           <a:p>
@@ -5726,16 +5814,13 @@
             </a:r>
             <a:r>
               <a:rPr lang="en-US" dirty="0" smtClean="0"/>
-              <a:t> delete-task –</a:t>
-            </a:r>
-            <a:r>
-              <a:rPr lang="en-US" dirty="0" err="1" smtClean="0"/>
+              <a:t> delete-task </a:t>
+            </a:r>
+            <a:r>
+              <a:rPr lang="en-US" smtClean="0"/>
               <a:t>url</a:t>
             </a:r>
-            <a:r>
-              <a:rPr lang="en-US" dirty="0" smtClean="0"/>
-              <a:t> “xx”</a:t>
-            </a:r>
+            <a:endParaRPr lang="en-US" dirty="0" smtClean="0"/>
           </a:p>
           <a:p>
             <a:r>

</xml_diff>

<commit_message>
Added RequestDeserializer, ResponseSerializer and CreateTaskService
RequestDeserializer: we use reflect to generate request
ResonseSerializer: we use it to serialize response to string
CreateTaskService: response for downloading
</commit_message>
<xml_diff>
--- a/doc/DownloadMetadata.pptx
+++ b/doc/DownloadMetadata.pptx
@@ -5736,51 +5736,39 @@
         </p:spPr>
         <p:txBody>
           <a:bodyPr>
-            <a:normAutofit fontScale="77500" lnSpcReduction="20000"/>
+            <a:normAutofit fontScale="85000" lnSpcReduction="20000"/>
           </a:bodyPr>
           <a:lstStyle/>
           <a:p>
             <a:r>
-              <a:rPr lang="en-US" dirty="0" err="1" smtClean="0"/>
-              <a:t>Iget</a:t>
+              <a:rPr lang="en-US" dirty="0"/>
+              <a:t>h</a:t>
             </a:r>
             <a:r>
               <a:rPr lang="en-US" dirty="0" smtClean="0"/>
-              <a:t> </a:t>
-            </a:r>
+              <a:t>elp ?</a:t>
+            </a:r>
+          </a:p>
+          <a:p>
             <a:r>
               <a:rPr lang="en-US" dirty="0" smtClean="0"/>
-              <a:t>help</a:t>
-            </a:r>
-          </a:p>
-          <a:p>
-            <a:r>
-              <a:rPr lang="en-US" dirty="0" err="1" smtClean="0"/>
-              <a:t>Iget</a:t>
+              <a:t>help command</a:t>
+            </a:r>
+          </a:p>
+          <a:p>
+            <a:r>
+              <a:rPr lang="en-US" dirty="0"/>
+              <a:t>v</a:t>
             </a:r>
             <a:r>
               <a:rPr lang="en-US" dirty="0" smtClean="0"/>
-              <a:t> help command</a:t>
-            </a:r>
-          </a:p>
-          <a:p>
-            <a:r>
-              <a:rPr lang="en-US" dirty="0" err="1" smtClean="0"/>
-              <a:t>Iget</a:t>
-            </a:r>
+              <a:t>ersion</a:t>
+            </a:r>
+          </a:p>
+          <a:p>
             <a:r>
               <a:rPr lang="en-US" dirty="0" smtClean="0"/>
-              <a:t> version</a:t>
-            </a:r>
-          </a:p>
-          <a:p>
-            <a:r>
-              <a:rPr lang="en-US" dirty="0" err="1" smtClean="0"/>
-              <a:t>Iget</a:t>
-            </a:r>
-            <a:r>
-              <a:rPr lang="en-US" dirty="0" smtClean="0"/>
-              <a:t> create-task </a:t>
+              <a:t>create-task </a:t>
             </a:r>
             <a:r>
               <a:rPr lang="en-US" dirty="0"/>
@@ -5809,42 +5797,30 @@
           </a:p>
           <a:p>
             <a:r>
-              <a:rPr lang="en-US" dirty="0" err="1" smtClean="0"/>
-              <a:t>Iget</a:t>
-            </a:r>
-            <a:r>
               <a:rPr lang="en-US" dirty="0" smtClean="0"/>
-              <a:t> delete-task </a:t>
-            </a:r>
-            <a:r>
-              <a:rPr lang="en-US" smtClean="0"/>
-              <a:t>url</a:t>
-            </a:r>
-            <a:endParaRPr lang="en-US" dirty="0" smtClean="0"/>
-          </a:p>
-          <a:p>
-            <a:r>
-              <a:rPr lang="en-US" dirty="0" err="1" smtClean="0"/>
-              <a:t>Iget</a:t>
-            </a:r>
-            <a:r>
-              <a:rPr lang="en-US" dirty="0" smtClean="0"/>
-              <a:t> delete-task –state “xx”</a:t>
-            </a:r>
-          </a:p>
-          <a:p>
-            <a:r>
-              <a:rPr lang="en-US" dirty="0" err="1" smtClean="0"/>
-              <a:t>Iget</a:t>
-            </a:r>
-            <a:r>
-              <a:rPr lang="en-US" dirty="0" smtClean="0"/>
-              <a:t> update-task-configuration –</a:t>
+              <a:t>delete-task </a:t>
             </a:r>
             <a:r>
               <a:rPr lang="en-US" dirty="0" err="1" smtClean="0"/>
               <a:t>url</a:t>
             </a:r>
+            <a:endParaRPr lang="en-US" dirty="0" smtClean="0"/>
+          </a:p>
+          <a:p>
+            <a:r>
+              <a:rPr lang="en-US" dirty="0" smtClean="0"/>
+              <a:t>delete-task –state “xx”</a:t>
+            </a:r>
+          </a:p>
+          <a:p>
+            <a:r>
+              <a:rPr lang="en-US" dirty="0" smtClean="0"/>
+              <a:t>update-task-configuration –</a:t>
+            </a:r>
+            <a:r>
+              <a:rPr lang="en-US" dirty="0" err="1" smtClean="0"/>
+              <a:t>url</a:t>
+            </a:r>
             <a:r>
               <a:rPr lang="en-US" dirty="0" smtClean="0"/>
               <a:t> “xx” [–folder “xx”] [–filename “xx”] [–</a:t>
@@ -5860,12 +5836,8 @@
           </a:p>
           <a:p>
             <a:r>
-              <a:rPr lang="en-US" dirty="0" err="1" smtClean="0"/>
-              <a:t>Iget</a:t>
-            </a:r>
-            <a:r>
               <a:rPr lang="en-US" dirty="0" smtClean="0"/>
-              <a:t> view-task-configuration –</a:t>
+              <a:t>view-task-configuration –</a:t>
             </a:r>
             <a:r>
               <a:rPr lang="en-US" dirty="0" err="1" smtClean="0"/>
@@ -5878,22 +5850,14 @@
           </a:p>
           <a:p>
             <a:r>
-              <a:rPr lang="en-US" dirty="0" err="1" smtClean="0"/>
-              <a:t>Iget</a:t>
-            </a:r>
-            <a:r>
               <a:rPr lang="en-US" dirty="0" smtClean="0"/>
-              <a:t> list-task [–all] [–state “xx”]</a:t>
-            </a:r>
-          </a:p>
-          <a:p>
-            <a:r>
-              <a:rPr lang="en-US" dirty="0" err="1" smtClean="0"/>
-              <a:t>Iget</a:t>
-            </a:r>
+              <a:t>list-task [–all] [–state “xx”]</a:t>
+            </a:r>
+          </a:p>
+          <a:p>
             <a:r>
               <a:rPr lang="en-US" dirty="0" smtClean="0"/>
-              <a:t> list-task –</a:t>
+              <a:t>list-task –</a:t>
             </a:r>
             <a:r>
               <a:rPr lang="en-US" dirty="0" err="1" smtClean="0"/>
@@ -5906,12 +5870,8 @@
           </a:p>
           <a:p>
             <a:r>
-              <a:rPr lang="en-US" dirty="0" err="1" smtClean="0"/>
-              <a:t>Iget</a:t>
-            </a:r>
-            <a:r>
               <a:rPr lang="en-US" dirty="0" smtClean="0"/>
-              <a:t> monitor-task [–</a:t>
+              <a:t>monitor-task [–</a:t>
             </a:r>
             <a:r>
               <a:rPr lang="en-US" dirty="0" err="1" smtClean="0"/>

</xml_diff>